<commit_message>
add ppt - Final Delivery
</commit_message>
<xml_diff>
--- a/Proj1/docs/IA-T10-G27-Checkpoint1.pptx
+++ b/Proj1/docs/IA-T10-G27-Checkpoint1.pptx
@@ -24231,7 +24231,15 @@
             </a:r>
             <a:r>
               <a:rPr lang="pt-PT" dirty="0"/>
-              <a:t> problema (</a:t>
+              <a:t> </a:t>
+            </a:r>
+            <a:r>
+              <a:rPr lang="pt-PT"/>
+              <a:t>problem </a:t>
+            </a:r>
+            <a:r>
+              <a:rPr lang="pt-PT" dirty="0"/>
+              <a:t>(</a:t>
             </a:r>
             <a:r>
               <a:rPr lang="pt-PT" dirty="0" err="1"/>

</xml_diff>